<commit_message>
Tweaks to slide deck.
</commit_message>
<xml_diff>
--- a/intro_scipy2016_pandas_tutorial.pptx
+++ b/intro_scipy2016_pandas_tutorial.pptx
@@ -12,11 +12,11 @@
   </p:handoutMasterIdLst>
   <p:sldIdLst>
     <p:sldId id="256" r:id="rId2"/>
-    <p:sldId id="453" r:id="rId3"/>
-    <p:sldId id="462" r:id="rId4"/>
-    <p:sldId id="463" r:id="rId5"/>
-    <p:sldId id="458" r:id="rId6"/>
-    <p:sldId id="461" r:id="rId7"/>
+    <p:sldId id="461" r:id="rId3"/>
+    <p:sldId id="453" r:id="rId4"/>
+    <p:sldId id="462" r:id="rId5"/>
+    <p:sldId id="463" r:id="rId6"/>
+    <p:sldId id="458" r:id="rId7"/>
     <p:sldId id="459" r:id="rId8"/>
   </p:sldIdLst>
   <p:sldSz cx="9144000" cy="6858000" type="screen4x3"/>
@@ -122,11 +122,11 @@
         <p14:section name="Default Section" id="{E572B81A-957A-CA41-A4E9-9993642D2C6B}">
           <p14:sldIdLst>
             <p14:sldId id="256"/>
+            <p14:sldId id="461"/>
             <p14:sldId id="453"/>
             <p14:sldId id="462"/>
             <p14:sldId id="463"/>
             <p14:sldId id="458"/>
-            <p14:sldId id="461"/>
             <p14:sldId id="459"/>
           </p14:sldIdLst>
         </p14:section>
@@ -235,7 +235,7 @@
           <a:p>
             <a:fld id="{53E90EA0-C2E5-C24D-BAB6-61BDC75E0F79}" type="datetimeFigureOut">
               <a:rPr lang="en-US" smtClean="0"/>
-              <a:t>7/10/16</a:t>
+              <a:t>7/11/16</a:t>
             </a:fld>
             <a:endParaRPr lang="en-US"/>
           </a:p>
@@ -401,7 +401,7 @@
           <a:p>
             <a:fld id="{BADE1553-BB48-E043-8703-B26D14BA86CC}" type="datetimeFigureOut">
               <a:rPr lang="en-US" smtClean="0"/>
-              <a:t>7/10/16</a:t>
+              <a:t>7/11/16</a:t>
             </a:fld>
             <a:endParaRPr lang="en-US"/>
           </a:p>
@@ -715,7 +715,7 @@
             <a:fld id="{98A1B512-A13D-4D61-A89F-064B9A0D3EAA}" type="slidenum">
               <a:rPr lang="en-US"/>
               <a:pPr/>
-              <a:t>4</a:t>
+              <a:t>5</a:t>
             </a:fld>
             <a:endParaRPr lang="en-US"/>
           </a:p>
@@ -3858,14 +3858,14 @@
           </a:ln>
           <a:extLst>
             <a:ext uri="{909E8E84-426E-40dd-AFC4-6F175D3DCCD1}">
-              <a14:hiddenFill xmlns:a14="http://schemas.microsoft.com/office/drawing/2010/main" xmlns="">
+              <a14:hiddenFill xmlns="" xmlns:a14="http://schemas.microsoft.com/office/drawing/2010/main">
                 <a:solidFill>
                   <a:srgbClr val="FFFFFF"/>
                 </a:solidFill>
               </a14:hiddenFill>
             </a:ext>
             <a:ext uri="{91240B29-F687-4f45-9708-019B960494DF}">
-              <a14:hiddenLine xmlns:a14="http://schemas.microsoft.com/office/drawing/2010/main" xmlns="" w="12700">
+              <a14:hiddenLine xmlns="" xmlns:a14="http://schemas.microsoft.com/office/drawing/2010/main" w="12700">
                 <a:solidFill>
                   <a:schemeClr val="tx1"/>
                 </a:solidFill>
@@ -4223,7 +4223,6 @@
               <a:rPr lang="en-US" sz="3200" dirty="0"/>
               <a:t>Analyzing and Manipulating Data with Pandas </a:t>
             </a:r>
-            <a:endParaRPr lang="en-US" sz="3200" dirty="0"/>
           </a:p>
         </p:txBody>
       </p:sp>
@@ -4240,12 +4239,12 @@
         <p:spPr>
           <a:xfrm>
             <a:off x="685799" y="3505199"/>
-            <a:ext cx="6618439" cy="2645080"/>
+            <a:ext cx="8298181" cy="2645080"/>
           </a:xfrm>
         </p:spPr>
         <p:txBody>
           <a:bodyPr>
-            <a:normAutofit fontScale="92500" lnSpcReduction="10000"/>
+            <a:normAutofit/>
           </a:bodyPr>
           <a:lstStyle/>
           <a:p>
@@ -4259,11 +4258,7 @@
             </a:r>
             <a:r>
               <a:rPr lang="en-US" dirty="0" smtClean="0"/>
-              <a:t>, </a:t>
-            </a:r>
-            <a:r>
-              <a:rPr lang="en-US" dirty="0" smtClean="0"/>
-              <a:t>2016</a:t>
+              <a:t>, 2016</a:t>
             </a:r>
           </a:p>
           <a:p>
@@ -4275,8 +4270,36 @@
               <a:t>Jonathan </a:t>
             </a:r>
             <a:r>
-              <a:rPr lang="en-US" dirty="0" err="1" smtClean="0"/>
+              <a:rPr lang="en-US" dirty="0" err="1"/>
               <a:t>Rocher</a:t>
+            </a:r>
+            <a:r>
+              <a:rPr lang="en-US" dirty="0"/>
+              <a:t> </a:t>
+            </a:r>
+            <a:r>
+              <a:rPr lang="en-US" dirty="0" smtClean="0"/>
+              <a:t>(</a:t>
+            </a:r>
+            <a:r>
+              <a:rPr lang="en-US" dirty="0" smtClean="0">
+                <a:latin typeface="Courier New" charset="0"/>
+                <a:ea typeface="Courier New" charset="0"/>
+                <a:cs typeface="Courier New" charset="0"/>
+              </a:rPr>
+              <a:t>@</a:t>
+            </a:r>
+            <a:r>
+              <a:rPr lang="en-US" dirty="0" err="1">
+                <a:latin typeface="Courier New" charset="0"/>
+                <a:ea typeface="Courier New" charset="0"/>
+                <a:cs typeface="Courier New" charset="0"/>
+              </a:rPr>
+              <a:t>jonrocher</a:t>
+            </a:r>
+            <a:r>
+              <a:rPr lang="en-US" dirty="0"/>
+              <a:t>)</a:t>
             </a:r>
             <a:r>
               <a:rPr lang="en-US" dirty="0" smtClean="0"/>
@@ -4285,38 +4308,13 @@
             <a:br>
               <a:rPr lang="en-US" dirty="0" smtClean="0"/>
             </a:br>
-            <a:endParaRPr lang="en-US" dirty="0" smtClean="0"/>
-          </a:p>
-          <a:p>
-            <a:r>
-              <a:rPr lang="en-US" dirty="0" err="1" smtClean="0"/>
-              <a:t>jrocher@kbibiopharma.com</a:t>
-            </a:r>
-            <a:endParaRPr lang="en-US" dirty="0"/>
-          </a:p>
-          <a:p>
-            <a:r>
-              <a:rPr lang="en-US" dirty="0" err="1" smtClean="0"/>
-              <a:t>Gihub</a:t>
-            </a:r>
             <a:r>
               <a:rPr lang="en-US" dirty="0" smtClean="0"/>
-              <a:t>: </a:t>
-            </a:r>
-            <a:r>
-              <a:rPr lang="en-US" dirty="0" err="1" smtClean="0"/>
-              <a:t>jonathanrocher</a:t>
-            </a:r>
-            <a:endParaRPr lang="en-US" dirty="0" smtClean="0"/>
-          </a:p>
-          <a:p>
+              <a:t>Principal </a:t>
+            </a:r>
             <a:r>
               <a:rPr lang="en-US" dirty="0" smtClean="0"/>
-              <a:t>Twitter: @</a:t>
-            </a:r>
-            <a:r>
-              <a:rPr lang="en-US" dirty="0" err="1" smtClean="0"/>
-              <a:t>jonrocher</a:t>
+              <a:t>Software Architect, KBI-Biopharma</a:t>
             </a:r>
             <a:endParaRPr lang="en-US" dirty="0"/>
           </a:p>
@@ -4414,94 +4412,105 @@
           <a:p>
             <a:r>
               <a:rPr lang="en-US" dirty="0" smtClean="0"/>
-              <a:t>Pandas</a:t>
+              <a:t>Thanks!</a:t>
             </a:r>
             <a:endParaRPr lang="en-US" dirty="0"/>
           </a:p>
         </p:txBody>
       </p:sp>
-      <p:sp>
-        <p:nvSpPr>
-          <p:cNvPr id="3" name="Content Placeholder 2"/>
-          <p:cNvSpPr>
-            <a:spLocks noGrp="1"/>
-          </p:cNvSpPr>
-          <p:nvPr>
-            <p:ph idx="1"/>
-          </p:nvPr>
-        </p:nvSpPr>
-        <p:spPr/>
-        <p:txBody>
-          <a:bodyPr/>
-          <a:lstStyle/>
-          <a:p>
-            <a:r>
-              <a:rPr lang="en-US" dirty="0" smtClean="0"/>
-              <a:t>Started by Wes McKinney circa 2009-2010.</a:t>
-            </a:r>
-          </a:p>
-          <a:p>
-            <a:r>
-              <a:rPr lang="en-US" dirty="0" smtClean="0"/>
-              <a:t>Emerged from the finance industry. Motivated by the toolbox in R for manipulating data easily. But Python is a better language</a:t>
-            </a:r>
-            <a:r>
-              <a:rPr lang="is-IS" dirty="0" smtClean="0"/>
-              <a:t>…</a:t>
-            </a:r>
-          </a:p>
-          <a:p>
-            <a:r>
-              <a:rPr lang="is-IS" dirty="0" smtClean="0"/>
-              <a:t>First public release is 0.3 in Feb 2011.</a:t>
-            </a:r>
-          </a:p>
-          <a:p>
-            <a:r>
-              <a:rPr lang="is-IS" dirty="0" smtClean="0"/>
-              <a:t>Maintained by a huge community now, headed by Jeff Reback.</a:t>
-            </a:r>
-          </a:p>
-          <a:p>
-            <a:r>
-              <a:rPr lang="is-IS" dirty="0" smtClean="0"/>
-              <a:t>Last release is 0.18.1 in May 2016.</a:t>
-            </a:r>
-          </a:p>
-          <a:p>
-            <a:r>
-              <a:rPr lang="is-IS" dirty="0"/>
-              <a:t>Open source (BSD</a:t>
-            </a:r>
-            <a:r>
-              <a:rPr lang="is-IS" dirty="0" smtClean="0"/>
-              <a:t>).</a:t>
-            </a:r>
-          </a:p>
-          <a:p>
-            <a:r>
-              <a:rPr lang="is-IS" dirty="0" smtClean="0"/>
-              <a:t>Has become a </a:t>
-            </a:r>
-            <a:r>
-              <a:rPr lang="is-IS" b="1" dirty="0" smtClean="0"/>
-              <a:t>corner stone of the SciPy ecosystem </a:t>
-            </a:r>
-            <a:r>
-              <a:rPr lang="is-IS" dirty="0" smtClean="0"/>
-              <a:t>for all things data! </a:t>
-            </a:r>
-            <a:endParaRPr lang="is-IS" dirty="0" smtClean="0"/>
-          </a:p>
-          <a:p>
-            <a:endParaRPr lang="en-US" dirty="0"/>
-          </a:p>
-        </p:txBody>
-      </p:sp>
+      <p:pic>
+        <p:nvPicPr>
+          <p:cNvPr id="6" name="Picture 5"/>
+          <p:cNvPicPr>
+            <a:picLocks noChangeAspect="1"/>
+          </p:cNvPicPr>
+          <p:nvPr/>
+        </p:nvPicPr>
+        <p:blipFill>
+          <a:blip r:embed="rId2">
+            <a:extLst>
+              <a:ext uri="{28A0092B-C50C-407E-A947-70E740481C1C}">
+                <a14:useLocalDpi xmlns:a14="http://schemas.microsoft.com/office/drawing/2010/main" val="0"/>
+              </a:ext>
+            </a:extLst>
+          </a:blip>
+          <a:stretch>
+            <a:fillRect/>
+          </a:stretch>
+        </p:blipFill>
+        <p:spPr>
+          <a:xfrm>
+            <a:off x="2575863" y="2043953"/>
+            <a:ext cx="3913095" cy="1043492"/>
+          </a:xfrm>
+          <a:prstGeom prst="rect">
+            <a:avLst/>
+          </a:prstGeom>
+        </p:spPr>
+      </p:pic>
+      <p:pic>
+        <p:nvPicPr>
+          <p:cNvPr id="7" name="Picture 6"/>
+          <p:cNvPicPr>
+            <a:picLocks noChangeAspect="1"/>
+          </p:cNvPicPr>
+          <p:nvPr/>
+        </p:nvPicPr>
+        <p:blipFill rotWithShape="1">
+          <a:blip r:embed="rId3">
+            <a:extLst>
+              <a:ext uri="{28A0092B-C50C-407E-A947-70E740481C1C}">
+                <a14:useLocalDpi xmlns:a14="http://schemas.microsoft.com/office/drawing/2010/main" val="0"/>
+              </a:ext>
+            </a:extLst>
+          </a:blip>
+          <a:srcRect b="28765"/>
+          <a:stretch/>
+        </p:blipFill>
+        <p:spPr>
+          <a:xfrm>
+            <a:off x="2785070" y="4636546"/>
+            <a:ext cx="4032737" cy="1957892"/>
+          </a:xfrm>
+          <a:prstGeom prst="rect">
+            <a:avLst/>
+          </a:prstGeom>
+        </p:spPr>
+      </p:pic>
+      <p:pic>
+        <p:nvPicPr>
+          <p:cNvPr id="8" name="Picture 7"/>
+          <p:cNvPicPr>
+            <a:picLocks noChangeAspect="1"/>
+          </p:cNvPicPr>
+          <p:nvPr/>
+        </p:nvPicPr>
+        <p:blipFill>
+          <a:blip r:embed="rId4">
+            <a:extLst>
+              <a:ext uri="{28A0092B-C50C-407E-A947-70E740481C1C}">
+                <a14:useLocalDpi xmlns:a14="http://schemas.microsoft.com/office/drawing/2010/main" val="0"/>
+              </a:ext>
+            </a:extLst>
+          </a:blip>
+          <a:stretch>
+            <a:fillRect/>
+          </a:stretch>
+        </p:blipFill>
+        <p:spPr>
+          <a:xfrm>
+            <a:off x="2950136" y="3455540"/>
+            <a:ext cx="3461422" cy="918029"/>
+          </a:xfrm>
+          <a:prstGeom prst="rect">
+            <a:avLst/>
+          </a:prstGeom>
+        </p:spPr>
+      </p:pic>
     </p:spTree>
     <p:extLst>
       <p:ext uri="{BB962C8B-B14F-4D97-AF65-F5344CB8AC3E}">
-        <p14:creationId xmlns:p14="http://schemas.microsoft.com/office/powerpoint/2010/main" val="2004699269"/>
+        <p14:creationId xmlns:p14="http://schemas.microsoft.com/office/powerpoint/2010/main" val="1576359433"/>
       </p:ext>
     </p:extLst>
   </p:cSld>
@@ -4545,7 +4554,7 @@
           <a:p>
             <a:r>
               <a:rPr lang="en-US" dirty="0" smtClean="0"/>
-              <a:t>Pandas’ mission</a:t>
+              <a:t>Pandas</a:t>
             </a:r>
             <a:endParaRPr lang="en-US" dirty="0"/>
           </a:p>
@@ -4563,212 +4572,88 @@
         </p:nvSpPr>
         <p:spPr/>
         <p:txBody>
-          <a:bodyPr>
-            <a:normAutofit/>
-          </a:bodyPr>
+          <a:bodyPr/>
           <a:lstStyle/>
           <a:p>
-            <a:pPr marL="0" indent="0">
-              <a:spcBef>
-                <a:spcPts val="0"/>
-              </a:spcBef>
-              <a:buClrTx/>
-              <a:buSzTx/>
-              <a:buNone/>
-            </a:pPr>
             <a:r>
               <a:rPr lang="en-US" dirty="0" smtClean="0"/>
-              <a:t>“To provide high-performance</a:t>
-            </a:r>
-            <a:r>
-              <a:rPr lang="en-US" dirty="0"/>
-              <a:t>, easy-to-use data structures and data analysis </a:t>
+              <a:t>Started by Wes McKinney </a:t>
             </a:r>
             <a:r>
               <a:rPr lang="en-US" dirty="0" smtClean="0"/>
-              <a:t>tools [in Python].”</a:t>
-            </a:r>
-          </a:p>
-          <a:p>
-            <a:pPr marL="0" indent="0">
-              <a:spcBef>
-                <a:spcPts val="0"/>
-              </a:spcBef>
-              <a:buClrTx/>
-              <a:buSzTx/>
-              <a:buNone/>
-            </a:pPr>
-            <a:endParaRPr lang="en-US" dirty="0"/>
-          </a:p>
-          <a:p>
-            <a:pPr marL="0" indent="0">
-              <a:spcBef>
-                <a:spcPts val="0"/>
-              </a:spcBef>
-              <a:buClrTx/>
-              <a:buSzTx/>
-              <a:buNone/>
-            </a:pPr>
+              <a:t>in </a:t>
+            </a:r>
             <a:r>
               <a:rPr lang="en-US" dirty="0" smtClean="0"/>
-              <a:t>Easy-to-use and performant:</a:t>
-            </a:r>
-          </a:p>
-          <a:p>
-            <a:pPr>
-              <a:spcBef>
-                <a:spcPts val="0"/>
-              </a:spcBef>
-              <a:buClrTx/>
-              <a:buSzTx/>
-            </a:pPr>
-            <a:r>
-              <a:rPr lang="en-US" b="1" dirty="0" smtClean="0"/>
-              <a:t>Self-describing</a:t>
-            </a:r>
+              <a:t>2009.</a:t>
+            </a:r>
+            <a:endParaRPr lang="en-US" dirty="0" smtClean="0"/>
+          </a:p>
+          <a:p>
             <a:r>
               <a:rPr lang="en-US" dirty="0" smtClean="0"/>
-              <a:t> data structures to understand, explore and clean the data.</a:t>
-            </a:r>
-          </a:p>
-          <a:p>
-            <a:pPr>
-              <a:spcBef>
-                <a:spcPts val="0"/>
-              </a:spcBef>
-              <a:buClrTx/>
-              <a:buSzTx/>
-            </a:pPr>
-            <a:r>
-              <a:rPr lang="en-US" dirty="0"/>
-              <a:t>Data loaders to/from common file </a:t>
-            </a:r>
-            <a:r>
-              <a:rPr lang="en-US" dirty="0" smtClean="0"/>
-              <a:t>formats (CSV, Excel </a:t>
-            </a:r>
-            <a:r>
-              <a:rPr lang="en-US" dirty="0" err="1" smtClean="0"/>
-              <a:t>json</a:t>
-            </a:r>
-            <a:r>
-              <a:rPr lang="en-US" dirty="0" smtClean="0"/>
-              <a:t>, SQL, SAS, Stata, </a:t>
+              <a:t>Emerged from the finance industry. Motivated by the toolbox in R for manipulating data easily. But Python is a better language</a:t>
             </a:r>
             <a:r>
               <a:rPr lang="is-IS" dirty="0" smtClean="0"/>
               <a:t>…</a:t>
             </a:r>
-            <a:r>
-              <a:rPr lang="en-US" dirty="0" smtClean="0"/>
+          </a:p>
+          <a:p>
+            <a:r>
+              <a:rPr lang="is-IS" dirty="0" smtClean="0"/>
+              <a:t>First public release is 0.3 in Feb 2011.</a:t>
+            </a:r>
+          </a:p>
+          <a:p>
+            <a:r>
+              <a:rPr lang="is-IS" dirty="0" smtClean="0"/>
+              <a:t>Grown and maintained </a:t>
+            </a:r>
+            <a:r>
+              <a:rPr lang="is-IS" dirty="0" smtClean="0"/>
+              <a:t>by a huge community now, headed by Jeff Reback.</a:t>
+            </a:r>
+          </a:p>
+          <a:p>
+            <a:r>
+              <a:rPr lang="is-IS" dirty="0" smtClean="0"/>
+              <a:t>Last release is 0.18.1 in May 2016.</a:t>
+            </a:r>
+          </a:p>
+          <a:p>
+            <a:r>
+              <a:rPr lang="is-IS" dirty="0"/>
+              <a:t>Open source (BSD</a:t>
+            </a:r>
+            <a:r>
+              <a:rPr lang="is-IS" dirty="0" smtClean="0"/>
               <a:t>).</a:t>
             </a:r>
           </a:p>
           <a:p>
-            <a:pPr>
-              <a:spcBef>
-                <a:spcPts val="0"/>
-              </a:spcBef>
-              <a:buClrTx/>
-              <a:buSzTx/>
-            </a:pPr>
-            <a:r>
-              <a:rPr lang="en-US" dirty="0" smtClean="0"/>
-              <a:t>Plotting functions to visualize the </a:t>
-            </a:r>
-            <a:r>
-              <a:rPr lang="en-US" dirty="0"/>
-              <a:t>data. See </a:t>
-            </a:r>
-            <a:r>
-              <a:rPr lang="en-US" dirty="0" err="1">
-                <a:latin typeface="Courier New" charset="0"/>
-                <a:ea typeface="Courier New" charset="0"/>
-                <a:cs typeface="Courier New" charset="0"/>
-              </a:rPr>
-              <a:t>Seaborn</a:t>
-            </a:r>
-            <a:r>
-              <a:rPr lang="en-US" dirty="0"/>
-              <a:t>, </a:t>
-            </a:r>
-            <a:r>
-              <a:rPr lang="en-US" dirty="0" err="1">
-                <a:latin typeface="Courier New" charset="0"/>
-                <a:ea typeface="Courier New" charset="0"/>
-                <a:cs typeface="Courier New" charset="0"/>
-              </a:rPr>
-              <a:t>Bokeh</a:t>
-            </a:r>
-            <a:r>
-              <a:rPr lang="is-IS" dirty="0"/>
-              <a:t>…</a:t>
-            </a:r>
-            <a:r>
-              <a:rPr lang="en-US" dirty="0"/>
-              <a:t> for more</a:t>
-            </a:r>
-            <a:r>
-              <a:rPr lang="en-US" dirty="0" smtClean="0"/>
-              <a:t>.</a:t>
-            </a:r>
-            <a:endParaRPr lang="en-US" dirty="0" smtClean="0"/>
-          </a:p>
-          <a:p>
-            <a:pPr>
-              <a:spcBef>
-                <a:spcPts val="0"/>
-              </a:spcBef>
-              <a:buClrTx/>
-              <a:buSzTx/>
-            </a:pPr>
-            <a:r>
-              <a:rPr lang="en-US" dirty="0" smtClean="0"/>
-              <a:t>Basic statistical analysis tools. See </a:t>
-            </a:r>
-            <a:r>
-              <a:rPr lang="en-US" dirty="0" err="1" smtClean="0">
-                <a:latin typeface="Courier New" charset="0"/>
-                <a:ea typeface="Courier New" charset="0"/>
-                <a:cs typeface="Courier New" charset="0"/>
-              </a:rPr>
-              <a:t>statsmodels</a:t>
-            </a:r>
-            <a:r>
-              <a:rPr lang="en-US" dirty="0" smtClean="0"/>
-              <a:t> and </a:t>
-            </a:r>
-            <a:r>
-              <a:rPr lang="en-US" dirty="0" err="1" smtClean="0">
-                <a:latin typeface="Courier New" charset="0"/>
-                <a:ea typeface="Courier New" charset="0"/>
-                <a:cs typeface="Courier New" charset="0"/>
-              </a:rPr>
-              <a:t>sklearn</a:t>
-            </a:r>
-            <a:r>
-              <a:rPr lang="en-US" dirty="0" err="1" smtClean="0"/>
-              <a:t>+</a:t>
-            </a:r>
-            <a:r>
-              <a:rPr lang="en-US" dirty="0" err="1" smtClean="0">
-                <a:latin typeface="Courier New" charset="0"/>
-                <a:ea typeface="Courier New" charset="0"/>
-                <a:cs typeface="Courier New" charset="0"/>
-              </a:rPr>
-              <a:t>sklean-pandas</a:t>
-            </a:r>
-            <a:r>
-              <a:rPr lang="en-US" dirty="0" smtClean="0"/>
-              <a:t> for more</a:t>
-            </a:r>
+            <a:r>
+              <a:rPr lang="is-IS" dirty="0" smtClean="0"/>
+              <a:t>Has become a </a:t>
+            </a:r>
+            <a:r>
+              <a:rPr lang="is-IS" b="1" dirty="0" smtClean="0"/>
+              <a:t>corner stone of the SciPy ecosystem </a:t>
+            </a:r>
+            <a:r>
+              <a:rPr lang="is-IS" dirty="0" smtClean="0"/>
+              <a:t>for all things data! </a:t>
+            </a:r>
+          </a:p>
+          <a:p>
+            <a:endParaRPr lang="en-US" dirty="0"/>
           </a:p>
         </p:txBody>
       </p:sp>
     </p:spTree>
     <p:extLst>
       <p:ext uri="{BB962C8B-B14F-4D97-AF65-F5344CB8AC3E}">
-        <p14:creationId xmlns:p14="http://schemas.microsoft.com/office/powerpoint/2010/main" val="1128986223"/>
+        <p14:creationId xmlns:p14="http://schemas.microsoft.com/office/powerpoint/2010/main" val="2004699269"/>
       </p:ext>
     </p:extLst>
   </p:cSld>
@@ -4797,6 +4682,282 @@
       </p:grpSpPr>
       <p:sp>
         <p:nvSpPr>
+          <p:cNvPr id="2" name="Title 1"/>
+          <p:cNvSpPr>
+            <a:spLocks noGrp="1"/>
+          </p:cNvSpPr>
+          <p:nvPr>
+            <p:ph type="title"/>
+          </p:nvPr>
+        </p:nvSpPr>
+        <p:spPr/>
+        <p:txBody>
+          <a:bodyPr/>
+          <a:lstStyle/>
+          <a:p>
+            <a:r>
+              <a:rPr lang="en-US" dirty="0" smtClean="0"/>
+              <a:t>Pandas’ mission</a:t>
+            </a:r>
+            <a:endParaRPr lang="en-US" dirty="0"/>
+          </a:p>
+        </p:txBody>
+      </p:sp>
+      <p:sp>
+        <p:nvSpPr>
+          <p:cNvPr id="3" name="Content Placeholder 2"/>
+          <p:cNvSpPr>
+            <a:spLocks noGrp="1"/>
+          </p:cNvSpPr>
+          <p:nvPr>
+            <p:ph idx="1"/>
+          </p:nvPr>
+        </p:nvSpPr>
+        <p:spPr/>
+        <p:txBody>
+          <a:bodyPr>
+            <a:normAutofit/>
+          </a:bodyPr>
+          <a:lstStyle/>
+          <a:p>
+            <a:pPr marL="0" indent="0">
+              <a:spcBef>
+                <a:spcPts val="0"/>
+              </a:spcBef>
+              <a:buClrTx/>
+              <a:buSzTx/>
+              <a:buNone/>
+            </a:pPr>
+            <a:r>
+              <a:rPr lang="en-US" dirty="0" smtClean="0"/>
+              <a:t>“To provide high-performance</a:t>
+            </a:r>
+            <a:r>
+              <a:rPr lang="en-US" dirty="0"/>
+              <a:t>, easy-to-use data structures and data analysis </a:t>
+            </a:r>
+            <a:r>
+              <a:rPr lang="en-US" dirty="0" smtClean="0"/>
+              <a:t>tools [in Python].”</a:t>
+            </a:r>
+          </a:p>
+          <a:p>
+            <a:pPr marL="0" indent="0">
+              <a:spcBef>
+                <a:spcPts val="0"/>
+              </a:spcBef>
+              <a:buClrTx/>
+              <a:buSzTx/>
+              <a:buNone/>
+            </a:pPr>
+            <a:endParaRPr lang="en-US" dirty="0"/>
+          </a:p>
+          <a:p>
+            <a:pPr marL="0" indent="0">
+              <a:spcBef>
+                <a:spcPts val="0"/>
+              </a:spcBef>
+              <a:buClrTx/>
+              <a:buSzTx/>
+              <a:buNone/>
+            </a:pPr>
+            <a:r>
+              <a:rPr lang="en-US" dirty="0" smtClean="0"/>
+              <a:t>Easy-to-use and performant:</a:t>
+            </a:r>
+          </a:p>
+          <a:p>
+            <a:pPr>
+              <a:spcBef>
+                <a:spcPts val="0"/>
+              </a:spcBef>
+              <a:buClrTx/>
+              <a:buSzTx/>
+            </a:pPr>
+            <a:r>
+              <a:rPr lang="en-US" b="1" dirty="0" smtClean="0"/>
+              <a:t>Self-describing</a:t>
+            </a:r>
+            <a:r>
+              <a:rPr lang="en-US" dirty="0" smtClean="0"/>
+              <a:t> data structures to understand, explore and clean the </a:t>
+            </a:r>
+            <a:r>
+              <a:rPr lang="en-US" dirty="0"/>
+              <a:t>data : 1D, 2D, 3D.</a:t>
+            </a:r>
+            <a:endParaRPr lang="en-US" dirty="0" smtClean="0"/>
+          </a:p>
+          <a:p>
+            <a:pPr>
+              <a:spcBef>
+                <a:spcPts val="0"/>
+              </a:spcBef>
+              <a:buClrTx/>
+              <a:buSzTx/>
+            </a:pPr>
+            <a:r>
+              <a:rPr lang="en-US" dirty="0"/>
+              <a:t>Data loaders to/from common file </a:t>
+            </a:r>
+            <a:r>
+              <a:rPr lang="en-US" dirty="0" smtClean="0"/>
+              <a:t>formats (CSV, Excel </a:t>
+            </a:r>
+            <a:r>
+              <a:rPr lang="en-US" dirty="0" err="1" smtClean="0"/>
+              <a:t>json</a:t>
+            </a:r>
+            <a:r>
+              <a:rPr lang="en-US" dirty="0" smtClean="0"/>
+              <a:t>, SQL, SAS, Stata, </a:t>
+            </a:r>
+            <a:r>
+              <a:rPr lang="is-IS" dirty="0" smtClean="0"/>
+              <a:t>…</a:t>
+            </a:r>
+            <a:r>
+              <a:rPr lang="en-US" dirty="0" smtClean="0"/>
+              <a:t>).</a:t>
+            </a:r>
+          </a:p>
+          <a:p>
+            <a:pPr>
+              <a:spcBef>
+                <a:spcPts val="0"/>
+              </a:spcBef>
+              <a:buClrTx/>
+              <a:buSzTx/>
+            </a:pPr>
+            <a:r>
+              <a:rPr lang="en-US" dirty="0" smtClean="0"/>
+              <a:t>Plotting functions to visualize the </a:t>
+            </a:r>
+            <a:r>
+              <a:rPr lang="en-US" dirty="0"/>
+              <a:t>data. See </a:t>
+            </a:r>
+            <a:r>
+              <a:rPr lang="en-US" dirty="0" err="1">
+                <a:latin typeface="Courier New" charset="0"/>
+                <a:ea typeface="Courier New" charset="0"/>
+                <a:cs typeface="Courier New" charset="0"/>
+              </a:rPr>
+              <a:t>Seaborn</a:t>
+            </a:r>
+            <a:r>
+              <a:rPr lang="en-US" dirty="0"/>
+              <a:t>, </a:t>
+            </a:r>
+            <a:r>
+              <a:rPr lang="en-US" dirty="0" err="1">
+                <a:latin typeface="Courier New" charset="0"/>
+                <a:ea typeface="Courier New" charset="0"/>
+                <a:cs typeface="Courier New" charset="0"/>
+              </a:rPr>
+              <a:t>Bokeh</a:t>
+            </a:r>
+            <a:r>
+              <a:rPr lang="is-IS" dirty="0"/>
+              <a:t>…</a:t>
+            </a:r>
+            <a:r>
+              <a:rPr lang="en-US" dirty="0"/>
+              <a:t> for more</a:t>
+            </a:r>
+            <a:r>
+              <a:rPr lang="en-US" dirty="0" smtClean="0"/>
+              <a:t>.</a:t>
+            </a:r>
+          </a:p>
+          <a:p>
+            <a:pPr>
+              <a:spcBef>
+                <a:spcPts val="0"/>
+              </a:spcBef>
+              <a:buClrTx/>
+              <a:buSzTx/>
+            </a:pPr>
+            <a:r>
+              <a:rPr lang="en-US" dirty="0" smtClean="0"/>
+              <a:t>Basic statistical analysis tools. See </a:t>
+            </a:r>
+            <a:r>
+              <a:rPr lang="en-US" dirty="0" err="1" smtClean="0">
+                <a:latin typeface="Courier New" charset="0"/>
+                <a:ea typeface="Courier New" charset="0"/>
+                <a:cs typeface="Courier New" charset="0"/>
+              </a:rPr>
+              <a:t>statsmodels</a:t>
+            </a:r>
+            <a:r>
+              <a:rPr lang="en-US" dirty="0" smtClean="0"/>
+              <a:t> and </a:t>
+            </a:r>
+            <a:r>
+              <a:rPr lang="en-US" dirty="0" err="1" smtClean="0">
+                <a:latin typeface="Courier New" charset="0"/>
+                <a:ea typeface="Courier New" charset="0"/>
+                <a:cs typeface="Courier New" charset="0"/>
+              </a:rPr>
+              <a:t>sklearn</a:t>
+            </a:r>
+            <a:r>
+              <a:rPr lang="en-US" dirty="0" err="1" smtClean="0"/>
+              <a:t>+</a:t>
+            </a:r>
+            <a:r>
+              <a:rPr lang="en-US" dirty="0" err="1" smtClean="0">
+                <a:latin typeface="Courier New" charset="0"/>
+                <a:ea typeface="Courier New" charset="0"/>
+                <a:cs typeface="Courier New" charset="0"/>
+              </a:rPr>
+              <a:t>sklean-pandas</a:t>
+            </a:r>
+            <a:r>
+              <a:rPr lang="en-US" dirty="0" smtClean="0"/>
+              <a:t> for </a:t>
+            </a:r>
+            <a:r>
+              <a:rPr lang="en-US" dirty="0" smtClean="0"/>
+              <a:t>more.</a:t>
+            </a:r>
+            <a:endParaRPr lang="en-US" dirty="0" smtClean="0"/>
+          </a:p>
+        </p:txBody>
+      </p:sp>
+    </p:spTree>
+    <p:extLst>
+      <p:ext uri="{BB962C8B-B14F-4D97-AF65-F5344CB8AC3E}">
+        <p14:creationId xmlns:p14="http://schemas.microsoft.com/office/powerpoint/2010/main" val="1128986223"/>
+      </p:ext>
+    </p:extLst>
+  </p:cSld>
+  <p:clrMapOvr>
+    <a:masterClrMapping/>
+  </p:clrMapOvr>
+</p:sld>
+</file>
+
+<file path=ppt/slides/slide5.xml><?xml version="1.0" encoding="utf-8"?>
+<p:sld xmlns:a="http://schemas.openxmlformats.org/drawingml/2006/main" xmlns:r="http://schemas.openxmlformats.org/officeDocument/2006/relationships" xmlns:p="http://schemas.openxmlformats.org/presentationml/2006/main">
+  <p:cSld>
+    <p:spTree>
+      <p:nvGrpSpPr>
+        <p:cNvPr id="1" name=""/>
+        <p:cNvGrpSpPr/>
+        <p:nvPr/>
+      </p:nvGrpSpPr>
+      <p:grpSpPr>
+        <a:xfrm>
+          <a:off x="0" y="0"/>
+          <a:ext cx="0" cy="0"/>
+          <a:chOff x="0" y="0"/>
+          <a:chExt cx="0" cy="0"/>
+        </a:xfrm>
+      </p:grpSpPr>
+      <p:sp>
+        <p:nvSpPr>
           <p:cNvPr id="30" name="Slide Number Placeholder 5"/>
           <p:cNvSpPr>
             <a:spLocks noGrp="1"/>
@@ -4813,7 +4974,7 @@
             <a:fld id="{D20CB2A5-D673-4675-B863-7953B265710A}" type="slidenum">
               <a:rPr lang="en-US"/>
               <a:pPr/>
-              <a:t>4</a:t>
+              <a:t>5</a:t>
             </a:fld>
             <a:endParaRPr lang="en-US"/>
           </a:p>
@@ -5275,7 +5436,7 @@
 </p:sld>
 </file>
 
-<file path=ppt/slides/slide5.xml><?xml version="1.0" encoding="utf-8"?>
+<file path=ppt/slides/slide6.xml><?xml version="1.0" encoding="utf-8"?>
 <p:sld xmlns:a="http://schemas.openxmlformats.org/drawingml/2006/main" xmlns:r="http://schemas.openxmlformats.org/officeDocument/2006/relationships" xmlns:p="http://schemas.openxmlformats.org/presentationml/2006/main">
   <p:cSld>
     <p:spTree>
@@ -5310,44 +5471,6 @@
             <a:r>
               <a:rPr lang="en-US" dirty="0" smtClean="0"/>
               <a:t>This tutorial’s mission</a:t>
-            </a:r>
-            <a:endParaRPr lang="en-US" dirty="0"/>
-          </a:p>
-        </p:txBody>
-      </p:sp>
-      <p:sp>
-        <p:nvSpPr>
-          <p:cNvPr id="3" name="Content Placeholder 2"/>
-          <p:cNvSpPr>
-            <a:spLocks noGrp="1"/>
-          </p:cNvSpPr>
-          <p:nvPr>
-            <p:ph idx="1"/>
-          </p:nvPr>
-        </p:nvSpPr>
-        <p:spPr>
-          <a:xfrm>
-            <a:off x="457200" y="5336087"/>
-            <a:ext cx="8229600" cy="1143647"/>
-          </a:xfrm>
-        </p:spPr>
-        <p:txBody>
-          <a:bodyPr>
-            <a:normAutofit lnSpcReduction="10000"/>
-          </a:bodyPr>
-          <a:lstStyle/>
-          <a:p>
-            <a:pPr marL="0" indent="0">
-              <a:spcBef>
-                <a:spcPts val="0"/>
-              </a:spcBef>
-              <a:buClrTx/>
-              <a:buSzTx/>
-              <a:buNone/>
-            </a:pPr>
-            <a:r>
-              <a:rPr lang="en-US" dirty="0" smtClean="0"/>
-              <a:t>To provide an beginner introduction to data management, data cleaning, and a bit of data modeling using Pandas (mostly).</a:t>
             </a:r>
             <a:endParaRPr lang="en-US" dirty="0"/>
           </a:p>
@@ -5375,7 +5498,7 @@
         </p:blipFill>
         <p:spPr>
           <a:xfrm>
-            <a:off x="825500" y="1689798"/>
+            <a:off x="825500" y="2146998"/>
             <a:ext cx="7493000" cy="3365500"/>
           </a:xfrm>
           <a:prstGeom prst="rect">
@@ -5387,148 +5510,6 @@
     <p:extLst>
       <p:ext uri="{BB962C8B-B14F-4D97-AF65-F5344CB8AC3E}">
         <p14:creationId xmlns:p14="http://schemas.microsoft.com/office/powerpoint/2010/main" val="1987999469"/>
-      </p:ext>
-    </p:extLst>
-  </p:cSld>
-  <p:clrMapOvr>
-    <a:masterClrMapping/>
-  </p:clrMapOvr>
-</p:sld>
-</file>
-
-<file path=ppt/slides/slide6.xml><?xml version="1.0" encoding="utf-8"?>
-<p:sld xmlns:a="http://schemas.openxmlformats.org/drawingml/2006/main" xmlns:r="http://schemas.openxmlformats.org/officeDocument/2006/relationships" xmlns:p="http://schemas.openxmlformats.org/presentationml/2006/main">
-  <p:cSld>
-    <p:spTree>
-      <p:nvGrpSpPr>
-        <p:cNvPr id="1" name=""/>
-        <p:cNvGrpSpPr/>
-        <p:nvPr/>
-      </p:nvGrpSpPr>
-      <p:grpSpPr>
-        <a:xfrm>
-          <a:off x="0" y="0"/>
-          <a:ext cx="0" cy="0"/>
-          <a:chOff x="0" y="0"/>
-          <a:chExt cx="0" cy="0"/>
-        </a:xfrm>
-      </p:grpSpPr>
-      <p:sp>
-        <p:nvSpPr>
-          <p:cNvPr id="2" name="Title 1"/>
-          <p:cNvSpPr>
-            <a:spLocks noGrp="1"/>
-          </p:cNvSpPr>
-          <p:nvPr>
-            <p:ph type="title"/>
-          </p:nvPr>
-        </p:nvSpPr>
-        <p:spPr/>
-        <p:txBody>
-          <a:bodyPr/>
-          <a:lstStyle/>
-          <a:p>
-            <a:r>
-              <a:rPr lang="en-US" dirty="0" smtClean="0"/>
-              <a:t>Thanks!</a:t>
-            </a:r>
-            <a:endParaRPr lang="en-US" dirty="0"/>
-          </a:p>
-        </p:txBody>
-      </p:sp>
-      <p:pic>
-        <p:nvPicPr>
-          <p:cNvPr id="6" name="Picture 5"/>
-          <p:cNvPicPr>
-            <a:picLocks noChangeAspect="1"/>
-          </p:cNvPicPr>
-          <p:nvPr/>
-        </p:nvPicPr>
-        <p:blipFill>
-          <a:blip r:embed="rId2">
-            <a:extLst>
-              <a:ext uri="{28A0092B-C50C-407E-A947-70E740481C1C}">
-                <a14:useLocalDpi xmlns:a14="http://schemas.microsoft.com/office/drawing/2010/main" val="0"/>
-              </a:ext>
-            </a:extLst>
-          </a:blip>
-          <a:stretch>
-            <a:fillRect/>
-          </a:stretch>
-        </p:blipFill>
-        <p:spPr>
-          <a:xfrm>
-            <a:off x="2575863" y="2043953"/>
-            <a:ext cx="3913095" cy="1043492"/>
-          </a:xfrm>
-          <a:prstGeom prst="rect">
-            <a:avLst/>
-          </a:prstGeom>
-        </p:spPr>
-      </p:pic>
-      <p:pic>
-        <p:nvPicPr>
-          <p:cNvPr id="7" name="Picture 6"/>
-          <p:cNvPicPr>
-            <a:picLocks noChangeAspect="1"/>
-          </p:cNvPicPr>
-          <p:nvPr/>
-        </p:nvPicPr>
-        <p:blipFill rotWithShape="1">
-          <a:blip r:embed="rId3">
-            <a:extLst>
-              <a:ext uri="{28A0092B-C50C-407E-A947-70E740481C1C}">
-                <a14:useLocalDpi xmlns:a14="http://schemas.microsoft.com/office/drawing/2010/main" val="0"/>
-              </a:ext>
-            </a:extLst>
-          </a:blip>
-          <a:srcRect b="28765"/>
-          <a:stretch/>
-        </p:blipFill>
-        <p:spPr>
-          <a:xfrm>
-            <a:off x="2785070" y="4636546"/>
-            <a:ext cx="4032737" cy="1957892"/>
-          </a:xfrm>
-          <a:prstGeom prst="rect">
-            <a:avLst/>
-          </a:prstGeom>
-        </p:spPr>
-      </p:pic>
-      <p:pic>
-        <p:nvPicPr>
-          <p:cNvPr id="8" name="Picture 7"/>
-          <p:cNvPicPr>
-            <a:picLocks noChangeAspect="1"/>
-          </p:cNvPicPr>
-          <p:nvPr/>
-        </p:nvPicPr>
-        <p:blipFill>
-          <a:blip r:embed="rId4">
-            <a:extLst>
-              <a:ext uri="{28A0092B-C50C-407E-A947-70E740481C1C}">
-                <a14:useLocalDpi xmlns:a14="http://schemas.microsoft.com/office/drawing/2010/main" val="0"/>
-              </a:ext>
-            </a:extLst>
-          </a:blip>
-          <a:stretch>
-            <a:fillRect/>
-          </a:stretch>
-        </p:blipFill>
-        <p:spPr>
-          <a:xfrm>
-            <a:off x="2950136" y="3455540"/>
-            <a:ext cx="3461422" cy="918029"/>
-          </a:xfrm>
-          <a:prstGeom prst="rect">
-            <a:avLst/>
-          </a:prstGeom>
-        </p:spPr>
-      </p:pic>
-    </p:spTree>
-    <p:extLst>
-      <p:ext uri="{BB962C8B-B14F-4D97-AF65-F5344CB8AC3E}">
-        <p14:creationId xmlns:p14="http://schemas.microsoft.com/office/powerpoint/2010/main" val="1576359433"/>
       </p:ext>
     </p:extLst>
   </p:cSld>
@@ -5635,12 +5616,12 @@
               <a:t>Goal: become better-informed citizens explore data on global temperatures, greenhouse </a:t>
             </a:r>
             <a:r>
-              <a:rPr lang="en-US" dirty="0" err="1" smtClean="0"/>
-              <a:t>gaz</a:t>
-            </a:r>
-            <a:r>
               <a:rPr lang="en-US" dirty="0" smtClean="0"/>
-              <a:t> and sea-level: load, clean, plot, correlate, </a:t>
+              <a:t>gas </a:t>
+            </a:r>
+            <a:r>
+              <a:rPr lang="en-US" dirty="0" smtClean="0"/>
+              <a:t>and sea-level: load, clean, plot, correlate, </a:t>
             </a:r>
             <a:r>
               <a:rPr lang="en-US" dirty="0"/>
@@ -5648,8 +5629,13 @@
             </a:r>
             <a:r>
               <a:rPr lang="en-US" dirty="0" smtClean="0"/>
-              <a:t>, resample (and model).</a:t>
-            </a:r>
+              <a:t>, </a:t>
+            </a:r>
+            <a:r>
+              <a:rPr lang="en-US" dirty="0" smtClean="0"/>
+              <a:t>resample, and model.</a:t>
+            </a:r>
+            <a:endParaRPr lang="en-US" dirty="0" smtClean="0"/>
           </a:p>
           <a:p>
             <a:pPr marL="0" indent="0">

</xml_diff>